<commit_message>
Update demo and slides
</commit_message>
<xml_diff>
--- a/slides/VueJS Basics and Vue CLI 3 workshop by Boris Nekezov.pptx
+++ b/slides/VueJS Basics and Vue CLI 3 workshop by Boris Nekezov.pptx
@@ -19,6 +19,9 @@
     <p:sldId id="267" r:id="rId13"/>
     <p:sldId id="268" r:id="rId14"/>
     <p:sldId id="269" r:id="rId15"/>
+    <p:sldId id="270" r:id="rId16"/>
+    <p:sldId id="271" r:id="rId17"/>
+    <p:sldId id="272" r:id="rId18"/>
   </p:sldIdLst>
   <p:sldSz cx="12192000" cy="6858000"/>
   <p:notesSz cx="6858000" cy="9144000"/>
@@ -4092,7 +4095,7 @@
             </a:r>
             <a:r>
               <a:rPr lang="en-US" dirty="0"/>
-              <a:t> run dev</a:t>
+              <a:t> run serve</a:t>
             </a:r>
           </a:p>
           <a:p>
@@ -4399,8 +4402,13 @@
           <a:p>
             <a:r>
               <a:rPr lang="en-US" dirty="0"/>
-              <a:t>Install workshop repo</a:t>
-            </a:r>
+              <a:t>11. Install workshop repo from </a:t>
+            </a:r>
+            <a:r>
+              <a:rPr lang="en-US" dirty="0" err="1"/>
+              <a:t>github</a:t>
+            </a:r>
+            <a:endParaRPr lang="en-US" dirty="0"/>
           </a:p>
         </p:txBody>
       </p:sp>
@@ -4445,9 +4453,34 @@
           </a:p>
           <a:p>
             <a:r>
-              <a:rPr lang="en-US"/>
-              <a:t>S</a:t>
-            </a:r>
+              <a:rPr lang="en-US" dirty="0"/>
+              <a:t>Install dependencies</a:t>
+            </a:r>
+          </a:p>
+          <a:p>
+            <a:r>
+              <a:rPr lang="en-US" dirty="0"/>
+              <a:t>Run builder</a:t>
+            </a:r>
+          </a:p>
+          <a:p>
+            <a:r>
+              <a:rPr lang="en-US" dirty="0"/>
+              <a:t>Open with editor </a:t>
+            </a:r>
+            <a:r>
+              <a:rPr lang="en-US" dirty="0" err="1"/>
+              <a:t>ir</a:t>
+            </a:r>
+            <a:r>
+              <a:rPr lang="en-US" dirty="0"/>
+              <a:t> IDE</a:t>
+            </a:r>
+          </a:p>
+          <a:p>
+            <a:pPr marL="0" indent="0">
+              <a:buNone/>
+            </a:pPr>
             <a:endParaRPr lang="en-US" dirty="0"/>
           </a:p>
         </p:txBody>
@@ -4456,6 +4489,626 @@
     <p:extLst>
       <p:ext uri="{BB962C8B-B14F-4D97-AF65-F5344CB8AC3E}">
         <p14:creationId xmlns:p14="http://schemas.microsoft.com/office/powerpoint/2010/main" val="1657543026"/>
+      </p:ext>
+    </p:extLst>
+  </p:cSld>
+  <p:clrMapOvr>
+    <a:masterClrMapping/>
+  </p:clrMapOvr>
+</p:sld>
+</file>
+
+<file path=ppt/slides/slide15.xml><?xml version="1.0" encoding="utf-8"?>
+<p:sld xmlns:a="http://schemas.openxmlformats.org/drawingml/2006/main" xmlns:r="http://schemas.openxmlformats.org/officeDocument/2006/relationships" xmlns:p="http://schemas.openxmlformats.org/presentationml/2006/main">
+  <p:cSld>
+    <p:spTree>
+      <p:nvGrpSpPr>
+        <p:cNvPr id="1" name=""/>
+        <p:cNvGrpSpPr/>
+        <p:nvPr/>
+      </p:nvGrpSpPr>
+      <p:grpSpPr>
+        <a:xfrm>
+          <a:off x="0" y="0"/>
+          <a:ext cx="0" cy="0"/>
+          <a:chOff x="0" y="0"/>
+          <a:chExt cx="0" cy="0"/>
+        </a:xfrm>
+      </p:grpSpPr>
+      <p:sp>
+        <p:nvSpPr>
+          <p:cNvPr id="2" name="Title 1">
+            <a:extLst>
+              <a:ext uri="{FF2B5EF4-FFF2-40B4-BE49-F238E27FC236}">
+                <a16:creationId xmlns:a16="http://schemas.microsoft.com/office/drawing/2014/main" id="{3944DDFA-50C1-4341-8EEA-3A2E3CB412DB}"/>
+              </a:ext>
+            </a:extLst>
+          </p:cNvPr>
+          <p:cNvSpPr>
+            <a:spLocks noGrp="1"/>
+          </p:cNvSpPr>
+          <p:nvPr>
+            <p:ph type="title"/>
+          </p:nvPr>
+        </p:nvSpPr>
+        <p:spPr/>
+        <p:txBody>
+          <a:bodyPr/>
+          <a:lstStyle/>
+          <a:p>
+            <a:r>
+              <a:rPr lang="en-US" dirty="0"/>
+              <a:t>12. Project Overview</a:t>
+            </a:r>
+          </a:p>
+        </p:txBody>
+      </p:sp>
+      <p:sp>
+        <p:nvSpPr>
+          <p:cNvPr id="3" name="Content Placeholder 2">
+            <a:extLst>
+              <a:ext uri="{FF2B5EF4-FFF2-40B4-BE49-F238E27FC236}">
+                <a16:creationId xmlns:a16="http://schemas.microsoft.com/office/drawing/2014/main" id="{1D20DB41-7E95-4E77-9070-01B3EDE95AFF}"/>
+              </a:ext>
+            </a:extLst>
+          </p:cNvPr>
+          <p:cNvSpPr>
+            <a:spLocks noGrp="1"/>
+          </p:cNvSpPr>
+          <p:nvPr>
+            <p:ph idx="1"/>
+          </p:nvPr>
+        </p:nvSpPr>
+        <p:spPr/>
+        <p:txBody>
+          <a:bodyPr>
+            <a:normAutofit lnSpcReduction="10000"/>
+          </a:bodyPr>
+          <a:lstStyle/>
+          <a:p>
+            <a:r>
+              <a:rPr lang="en-US" sz="2000" dirty="0" err="1"/>
+              <a:t>vuejs</a:t>
+            </a:r>
+            <a:r>
+              <a:rPr lang="en-US" sz="2000" dirty="0"/>
+              <a:t>-basic</a:t>
+            </a:r>
+          </a:p>
+          <a:p>
+            <a:pPr lvl="1"/>
+            <a:r>
+              <a:rPr lang="en-US" sz="1800" dirty="0" err="1"/>
+              <a:t>node_modules</a:t>
+            </a:r>
+            <a:r>
+              <a:rPr lang="en-US" sz="1800" dirty="0"/>
+              <a:t> </a:t>
+            </a:r>
+          </a:p>
+          <a:p>
+            <a:pPr lvl="1"/>
+            <a:r>
+              <a:rPr lang="en-US" sz="1800" dirty="0"/>
+              <a:t>public</a:t>
+            </a:r>
+          </a:p>
+          <a:p>
+            <a:pPr lvl="2"/>
+            <a:r>
+              <a:rPr lang="en-US" sz="1600" dirty="0"/>
+              <a:t>index.html</a:t>
+            </a:r>
+          </a:p>
+          <a:p>
+            <a:pPr lvl="1"/>
+            <a:r>
+              <a:rPr lang="en-US" sz="1800" dirty="0" err="1"/>
+              <a:t>src</a:t>
+            </a:r>
+            <a:endParaRPr lang="en-US" sz="1800" dirty="0"/>
+          </a:p>
+          <a:p>
+            <a:pPr lvl="2"/>
+            <a:r>
+              <a:rPr lang="en-US" sz="1600" dirty="0"/>
+              <a:t>assets</a:t>
+            </a:r>
+          </a:p>
+          <a:p>
+            <a:pPr lvl="2"/>
+            <a:r>
+              <a:rPr lang="en-US" sz="1600" dirty="0"/>
+              <a:t>components	</a:t>
+            </a:r>
+          </a:p>
+          <a:p>
+            <a:pPr lvl="3"/>
+            <a:r>
+              <a:rPr lang="en-US" sz="1400" dirty="0" err="1"/>
+              <a:t>appfooter.vue</a:t>
+            </a:r>
+            <a:endParaRPr lang="en-US" sz="1400" dirty="0"/>
+          </a:p>
+          <a:p>
+            <a:pPr lvl="3"/>
+            <a:r>
+              <a:rPr lang="en-US" sz="1400" dirty="0" err="1"/>
+              <a:t>appheader.vue</a:t>
+            </a:r>
+            <a:endParaRPr lang="en-US" sz="1400" dirty="0"/>
+          </a:p>
+          <a:p>
+            <a:pPr lvl="3"/>
+            <a:r>
+              <a:rPr lang="en-US" sz="1400" dirty="0" err="1"/>
+              <a:t>appmain.vue</a:t>
+            </a:r>
+            <a:endParaRPr lang="en-US" sz="1400" dirty="0"/>
+          </a:p>
+          <a:p>
+            <a:pPr lvl="2"/>
+            <a:r>
+              <a:rPr lang="en-US" sz="1600" dirty="0" err="1"/>
+              <a:t>app.vue</a:t>
+            </a:r>
+            <a:endParaRPr lang="en-US" sz="1600" dirty="0"/>
+          </a:p>
+          <a:p>
+            <a:pPr lvl="2"/>
+            <a:r>
+              <a:rPr lang="en-US" sz="1600" dirty="0"/>
+              <a:t>main.js</a:t>
+            </a:r>
+          </a:p>
+          <a:p>
+            <a:pPr lvl="2"/>
+            <a:r>
+              <a:rPr lang="en-US" sz="1600" dirty="0"/>
+              <a:t>.</a:t>
+            </a:r>
+            <a:r>
+              <a:rPr lang="en-US" sz="1600" dirty="0" err="1"/>
+              <a:t>gitignore</a:t>
+            </a:r>
+            <a:endParaRPr lang="en-US" sz="1600" dirty="0"/>
+          </a:p>
+          <a:p>
+            <a:pPr lvl="2"/>
+            <a:r>
+              <a:rPr lang="en-US" sz="1600" dirty="0" err="1"/>
+              <a:t>package.json</a:t>
+            </a:r>
+            <a:endParaRPr lang="en-US" sz="1600" dirty="0"/>
+          </a:p>
+          <a:p>
+            <a:pPr lvl="2"/>
+            <a:r>
+              <a:rPr lang="en-US" sz="1600" dirty="0"/>
+              <a:t>package-</a:t>
+            </a:r>
+            <a:r>
+              <a:rPr lang="en-US" sz="1600" dirty="0" err="1"/>
+              <a:t>lock.json</a:t>
+            </a:r>
+            <a:endParaRPr lang="en-US" sz="1600" dirty="0"/>
+          </a:p>
+          <a:p>
+            <a:pPr lvl="2"/>
+            <a:r>
+              <a:rPr lang="en-US" sz="1600" dirty="0"/>
+              <a:t>readme.md</a:t>
+            </a:r>
+          </a:p>
+        </p:txBody>
+      </p:sp>
+    </p:spTree>
+    <p:extLst>
+      <p:ext uri="{BB962C8B-B14F-4D97-AF65-F5344CB8AC3E}">
+        <p14:creationId xmlns:p14="http://schemas.microsoft.com/office/powerpoint/2010/main" val="3318562412"/>
+      </p:ext>
+    </p:extLst>
+  </p:cSld>
+  <p:clrMapOvr>
+    <a:masterClrMapping/>
+  </p:clrMapOvr>
+</p:sld>
+</file>
+
+<file path=ppt/slides/slide16.xml><?xml version="1.0" encoding="utf-8"?>
+<p:sld xmlns:a="http://schemas.openxmlformats.org/drawingml/2006/main" xmlns:r="http://schemas.openxmlformats.org/officeDocument/2006/relationships" xmlns:p="http://schemas.openxmlformats.org/presentationml/2006/main">
+  <p:cSld>
+    <p:spTree>
+      <p:nvGrpSpPr>
+        <p:cNvPr id="1" name=""/>
+        <p:cNvGrpSpPr/>
+        <p:nvPr/>
+      </p:nvGrpSpPr>
+      <p:grpSpPr>
+        <a:xfrm>
+          <a:off x="0" y="0"/>
+          <a:ext cx="0" cy="0"/>
+          <a:chOff x="0" y="0"/>
+          <a:chExt cx="0" cy="0"/>
+        </a:xfrm>
+      </p:grpSpPr>
+      <p:sp>
+        <p:nvSpPr>
+          <p:cNvPr id="2" name="Title 1">
+            <a:extLst>
+              <a:ext uri="{FF2B5EF4-FFF2-40B4-BE49-F238E27FC236}">
+                <a16:creationId xmlns:a16="http://schemas.microsoft.com/office/drawing/2014/main" id="{E4E8A9F1-2CFC-4667-9EE3-5781ECB46DE7}"/>
+              </a:ext>
+            </a:extLst>
+          </p:cNvPr>
+          <p:cNvSpPr>
+            <a:spLocks noGrp="1"/>
+          </p:cNvSpPr>
+          <p:nvPr>
+            <p:ph type="title"/>
+          </p:nvPr>
+        </p:nvSpPr>
+        <p:spPr/>
+        <p:txBody>
+          <a:bodyPr/>
+          <a:lstStyle/>
+          <a:p>
+            <a:r>
+              <a:rPr lang="en-US" dirty="0"/>
+              <a:t>13. Explaining workshop demo</a:t>
+            </a:r>
+          </a:p>
+        </p:txBody>
+      </p:sp>
+      <p:sp>
+        <p:nvSpPr>
+          <p:cNvPr id="3" name="Content Placeholder 2">
+            <a:extLst>
+              <a:ext uri="{FF2B5EF4-FFF2-40B4-BE49-F238E27FC236}">
+                <a16:creationId xmlns:a16="http://schemas.microsoft.com/office/drawing/2014/main" id="{65661990-5DDF-4343-AD50-4A62F6FF4B38}"/>
+              </a:ext>
+            </a:extLst>
+          </p:cNvPr>
+          <p:cNvSpPr>
+            <a:spLocks noGrp="1"/>
+          </p:cNvSpPr>
+          <p:nvPr>
+            <p:ph idx="1"/>
+          </p:nvPr>
+        </p:nvSpPr>
+        <p:spPr/>
+        <p:txBody>
+          <a:bodyPr>
+            <a:normAutofit fontScale="62500" lnSpcReduction="20000"/>
+          </a:bodyPr>
+          <a:lstStyle/>
+          <a:p>
+            <a:r>
+              <a:rPr lang="en-US" dirty="0"/>
+              <a:t>Index.html</a:t>
+            </a:r>
+          </a:p>
+          <a:p>
+            <a:pPr lvl="1"/>
+            <a:r>
+              <a:rPr lang="en-US" dirty="0"/>
+              <a:t>Add </a:t>
+            </a:r>
+            <a:r>
+              <a:rPr lang="en-US" dirty="0" err="1"/>
+              <a:t>div#app</a:t>
+            </a:r>
+            <a:endParaRPr lang="en-US" dirty="0"/>
+          </a:p>
+          <a:p>
+            <a:r>
+              <a:rPr lang="en-US" dirty="0"/>
+              <a:t>Main.js</a:t>
+            </a:r>
+          </a:p>
+          <a:p>
+            <a:pPr lvl="1"/>
+            <a:r>
+              <a:rPr lang="en-US" dirty="0"/>
+              <a:t>Import </a:t>
+            </a:r>
+            <a:r>
+              <a:rPr lang="en-US" dirty="0" err="1"/>
+              <a:t>VueJS</a:t>
+            </a:r>
+            <a:r>
+              <a:rPr lang="en-US" dirty="0"/>
+              <a:t> and all plugins we need here</a:t>
+            </a:r>
+          </a:p>
+          <a:p>
+            <a:pPr lvl="1"/>
+            <a:r>
+              <a:rPr lang="en-US" dirty="0"/>
+              <a:t>Import </a:t>
+            </a:r>
+            <a:r>
+              <a:rPr lang="en-US" dirty="0" err="1"/>
+              <a:t>App.vue</a:t>
+            </a:r>
+            <a:endParaRPr lang="en-US" dirty="0"/>
+          </a:p>
+          <a:p>
+            <a:pPr lvl="1"/>
+            <a:r>
+              <a:rPr lang="en-US" dirty="0"/>
+              <a:t>Create Vue instance</a:t>
+            </a:r>
+          </a:p>
+          <a:p>
+            <a:r>
+              <a:rPr lang="en-US" dirty="0" err="1"/>
+              <a:t>App.vue</a:t>
+            </a:r>
+            <a:endParaRPr lang="en-US" dirty="0"/>
+          </a:p>
+          <a:p>
+            <a:pPr lvl="1"/>
+            <a:r>
+              <a:rPr lang="en-US" dirty="0"/>
+              <a:t>Template	</a:t>
+            </a:r>
+          </a:p>
+          <a:p>
+            <a:pPr lvl="2"/>
+            <a:r>
+              <a:rPr lang="en-US" dirty="0"/>
+              <a:t>only one nested element	</a:t>
+            </a:r>
+          </a:p>
+          <a:p>
+            <a:pPr lvl="1"/>
+            <a:r>
+              <a:rPr lang="en-US" dirty="0"/>
+              <a:t>Script</a:t>
+            </a:r>
+          </a:p>
+          <a:p>
+            <a:pPr lvl="2"/>
+            <a:r>
+              <a:rPr lang="en-US" dirty="0"/>
+              <a:t>Import other components</a:t>
+            </a:r>
+          </a:p>
+          <a:p>
+            <a:pPr lvl="2"/>
+            <a:r>
+              <a:rPr lang="en-US" dirty="0"/>
+              <a:t>Register components</a:t>
+            </a:r>
+          </a:p>
+          <a:p>
+            <a:pPr lvl="3"/>
+            <a:r>
+              <a:rPr lang="en-US" dirty="0"/>
+              <a:t>Explain ES6 syntax</a:t>
+            </a:r>
+          </a:p>
+          <a:p>
+            <a:pPr lvl="2"/>
+            <a:r>
+              <a:rPr lang="en-US" dirty="0"/>
+              <a:t>Call components in template</a:t>
+            </a:r>
+          </a:p>
+          <a:p>
+            <a:pPr lvl="3"/>
+            <a:endParaRPr lang="en-US" dirty="0"/>
+          </a:p>
+          <a:p>
+            <a:pPr lvl="1"/>
+            <a:r>
+              <a:rPr lang="en-US" dirty="0"/>
+              <a:t>Style</a:t>
+            </a:r>
+          </a:p>
+          <a:p>
+            <a:pPr lvl="2"/>
+            <a:r>
+              <a:rPr lang="en-US" dirty="0"/>
+              <a:t>Lang=“</a:t>
+            </a:r>
+            <a:r>
+              <a:rPr lang="en-US" dirty="0" err="1"/>
+              <a:t>scss</a:t>
+            </a:r>
+            <a:r>
+              <a:rPr lang="en-US" dirty="0"/>
+              <a:t>”</a:t>
+            </a:r>
+          </a:p>
+          <a:p>
+            <a:pPr lvl="2"/>
+            <a:r>
+              <a:rPr lang="en-US" dirty="0"/>
+              <a:t>Scoped</a:t>
+            </a:r>
+          </a:p>
+        </p:txBody>
+      </p:sp>
+    </p:spTree>
+    <p:extLst>
+      <p:ext uri="{BB962C8B-B14F-4D97-AF65-F5344CB8AC3E}">
+        <p14:creationId xmlns:p14="http://schemas.microsoft.com/office/powerpoint/2010/main" val="1199029865"/>
+      </p:ext>
+    </p:extLst>
+  </p:cSld>
+  <p:clrMapOvr>
+    <a:masterClrMapping/>
+  </p:clrMapOvr>
+</p:sld>
+</file>
+
+<file path=ppt/slides/slide17.xml><?xml version="1.0" encoding="utf-8"?>
+<p:sld xmlns:a="http://schemas.openxmlformats.org/drawingml/2006/main" xmlns:r="http://schemas.openxmlformats.org/officeDocument/2006/relationships" xmlns:p="http://schemas.openxmlformats.org/presentationml/2006/main">
+  <p:cSld>
+    <p:spTree>
+      <p:nvGrpSpPr>
+        <p:cNvPr id="1" name=""/>
+        <p:cNvGrpSpPr/>
+        <p:nvPr/>
+      </p:nvGrpSpPr>
+      <p:grpSpPr>
+        <a:xfrm>
+          <a:off x="0" y="0"/>
+          <a:ext cx="0" cy="0"/>
+          <a:chOff x="0" y="0"/>
+          <a:chExt cx="0" cy="0"/>
+        </a:xfrm>
+      </p:grpSpPr>
+      <p:sp>
+        <p:nvSpPr>
+          <p:cNvPr id="2" name="Title 1">
+            <a:extLst>
+              <a:ext uri="{FF2B5EF4-FFF2-40B4-BE49-F238E27FC236}">
+                <a16:creationId xmlns:a16="http://schemas.microsoft.com/office/drawing/2014/main" id="{9B5773EB-D4E7-4A84-87F2-789CE7D86E46}"/>
+              </a:ext>
+            </a:extLst>
+          </p:cNvPr>
+          <p:cNvSpPr>
+            <a:spLocks noGrp="1"/>
+          </p:cNvSpPr>
+          <p:nvPr>
+            <p:ph type="title"/>
+          </p:nvPr>
+        </p:nvSpPr>
+        <p:spPr/>
+        <p:txBody>
+          <a:bodyPr/>
+          <a:lstStyle/>
+          <a:p>
+            <a:r>
+              <a:rPr lang="en-US" dirty="0"/>
+              <a:t>13. Explaining workshop demo Part 2	</a:t>
+            </a:r>
+          </a:p>
+        </p:txBody>
+      </p:sp>
+      <p:sp>
+        <p:nvSpPr>
+          <p:cNvPr id="3" name="Content Placeholder 2">
+            <a:extLst>
+              <a:ext uri="{FF2B5EF4-FFF2-40B4-BE49-F238E27FC236}">
+                <a16:creationId xmlns:a16="http://schemas.microsoft.com/office/drawing/2014/main" id="{04AD9631-3DFC-4185-AB45-471396DCD4F5}"/>
+              </a:ext>
+            </a:extLst>
+          </p:cNvPr>
+          <p:cNvSpPr>
+            <a:spLocks noGrp="1"/>
+          </p:cNvSpPr>
+          <p:nvPr>
+            <p:ph idx="1"/>
+          </p:nvPr>
+        </p:nvSpPr>
+        <p:spPr/>
+        <p:txBody>
+          <a:bodyPr/>
+          <a:lstStyle/>
+          <a:p>
+            <a:r>
+              <a:rPr lang="en-US" dirty="0"/>
+              <a:t>Go to </a:t>
+            </a:r>
+            <a:r>
+              <a:rPr lang="en-US" dirty="0" err="1"/>
+              <a:t>Header.vue</a:t>
+            </a:r>
+            <a:endParaRPr lang="en-US" dirty="0"/>
+          </a:p>
+          <a:p>
+            <a:pPr lvl="1"/>
+            <a:r>
+              <a:rPr lang="en-US" dirty="0" err="1"/>
+              <a:t>Explaing</a:t>
+            </a:r>
+            <a:r>
+              <a:rPr lang="en-US" dirty="0"/>
+              <a:t> data</a:t>
+            </a:r>
+          </a:p>
+          <a:p>
+            <a:pPr lvl="1"/>
+            <a:r>
+              <a:rPr lang="en-US" dirty="0"/>
+              <a:t>Printing variables in the template</a:t>
+            </a:r>
+          </a:p>
+          <a:p>
+            <a:r>
+              <a:rPr lang="en-US" dirty="0"/>
+              <a:t>Go to Main</a:t>
+            </a:r>
+          </a:p>
+          <a:p>
+            <a:pPr lvl="1"/>
+            <a:r>
+              <a:rPr lang="en-US" dirty="0"/>
+              <a:t>Directives </a:t>
+            </a:r>
+          </a:p>
+          <a:p>
+            <a:pPr lvl="2"/>
+            <a:r>
+              <a:rPr lang="en-US" dirty="0"/>
+              <a:t>v-on</a:t>
+            </a:r>
+          </a:p>
+          <a:p>
+            <a:pPr lvl="2"/>
+            <a:r>
+              <a:rPr lang="en-US" dirty="0"/>
+              <a:t>v-bind</a:t>
+            </a:r>
+          </a:p>
+          <a:p>
+            <a:pPr lvl="2"/>
+            <a:r>
+              <a:rPr lang="en-US" dirty="0"/>
+              <a:t>V-once</a:t>
+            </a:r>
+          </a:p>
+        </p:txBody>
+      </p:sp>
+      <p:sp>
+        <p:nvSpPr>
+          <p:cNvPr id="4" name="Rectangle 3">
+            <a:extLst>
+              <a:ext uri="{FF2B5EF4-FFF2-40B4-BE49-F238E27FC236}">
+                <a16:creationId xmlns:a16="http://schemas.microsoft.com/office/drawing/2014/main" id="{B53D66A2-9282-4AE7-A474-1D729B38AE19}"/>
+              </a:ext>
+            </a:extLst>
+          </p:cNvPr>
+          <p:cNvSpPr/>
+          <p:nvPr/>
+        </p:nvSpPr>
+        <p:spPr>
+          <a:xfrm rot="5638707">
+            <a:off x="4567889" y="3244334"/>
+            <a:ext cx="184731" cy="369332"/>
+          </a:xfrm>
+          <a:prstGeom prst="rect">
+            <a:avLst/>
+          </a:prstGeom>
+        </p:spPr>
+        <p:txBody>
+          <a:bodyPr wrap="none">
+            <a:spAutoFit/>
+          </a:bodyPr>
+          <a:lstStyle/>
+          <a:p>
+            <a:endParaRPr lang="en-US" dirty="0"/>
+          </a:p>
+        </p:txBody>
+      </p:sp>
+    </p:spTree>
+    <p:extLst>
+      <p:ext uri="{BB962C8B-B14F-4D97-AF65-F5344CB8AC3E}">
+        <p14:creationId xmlns:p14="http://schemas.microsoft.com/office/powerpoint/2010/main" val="3328734652"/>
       </p:ext>
     </p:extLst>
   </p:cSld>

</xml_diff>